<commit_message>
moved scoring to separate class
</commit_message>
<xml_diff>
--- a/Scrabble Word Suggestor.pptx
+++ b/Scrabble Word Suggestor.pptx
@@ -11,6 +11,7 @@
     <p:sldId id="259" r:id="rId5"/>
     <p:sldId id="260" r:id="rId6"/>
     <p:sldId id="261" r:id="rId7"/>
+    <p:sldId id="262" r:id="rId8"/>
   </p:sldIdLst>
   <p:sldSz cx="9144000" cy="6858000" type="screen4x3"/>
   <p:notesSz cx="6858000" cy="9144000"/>
@@ -3194,31 +3195,76 @@
           <a:lstStyle/>
           <a:p>
             <a:r>
+              <a:rPr lang="en-US" dirty="0" err="1"/>
+              <a:t>ScrabbleWords</a:t>
+            </a:r>
+            <a:endParaRPr lang="en-US" dirty="0"/>
+          </a:p>
+        </p:txBody>
+      </p:sp>
+      <p:sp>
+        <p:nvSpPr>
+          <p:cNvPr id="3" name="Content Placeholder 2"/>
+          <p:cNvSpPr>
+            <a:spLocks noGrp="1"/>
+          </p:cNvSpPr>
+          <p:nvPr>
+            <p:ph idx="1"/>
+          </p:nvPr>
+        </p:nvSpPr>
+        <p:spPr/>
+        <p:txBody>
+          <a:bodyPr>
+            <a:normAutofit fontScale="92500" lnSpcReduction="10000"/>
+          </a:bodyPr>
+          <a:lstStyle/>
+          <a:p>
+            <a:r>
+              <a:rPr lang="en-US" dirty="0" smtClean="0"/>
+              <a:t>Usage</a:t>
+            </a:r>
+            <a:r>
+              <a:rPr lang="en-US" dirty="0" smtClean="0"/>
+              <a:t>:</a:t>
+            </a:r>
+          </a:p>
+          <a:p>
+            <a:pPr marL="0" indent="0">
+              <a:buNone/>
+            </a:pPr>
+            <a:r>
+              <a:rPr lang="en-US" dirty="0"/>
+              <a:t> </a:t>
+            </a:r>
+            <a:r>
+              <a:rPr lang="en-US" dirty="0" smtClean="0"/>
+              <a:t>    a) </a:t>
+            </a:r>
+            <a:r>
               <a:rPr lang="en-US" dirty="0" err="1" smtClean="0"/>
-              <a:t>ScrabbleHelper</a:t>
+              <a:t>isValidWord</a:t>
             </a:r>
             <a:endParaRPr lang="en-US" dirty="0"/>
           </a:p>
-        </p:txBody>
-      </p:sp>
-      <p:sp>
-        <p:nvSpPr>
-          <p:cNvPr id="3" name="Content Placeholder 2"/>
-          <p:cNvSpPr>
-            <a:spLocks noGrp="1"/>
-          </p:cNvSpPr>
-          <p:nvPr>
-            <p:ph idx="1"/>
-          </p:nvPr>
-        </p:nvSpPr>
-        <p:spPr/>
-        <p:txBody>
-          <a:bodyPr/>
-          <a:lstStyle/>
-          <a:p>
+          <a:p>
+            <a:pPr marL="0" indent="0">
+              <a:buNone/>
+            </a:pPr>
+            <a:r>
+              <a:rPr lang="en-US" dirty="0"/>
+              <a:t>	</a:t>
+            </a:r>
             <a:r>
               <a:rPr lang="en-US" dirty="0" smtClean="0"/>
-              <a:t>Usage:</a:t>
+              <a:t>Input </a:t>
+            </a:r>
+            <a:r>
+              <a:rPr lang="en-US" dirty="0"/>
+              <a:t>- a </a:t>
+            </a:r>
+            <a:r>
+              <a:rPr lang="en-US" dirty="0" smtClean="0"/>
+              <a:t>word</a:t>
             </a:r>
           </a:p>
           <a:p>
@@ -3226,109 +3272,99 @@
               <a:buNone/>
             </a:pPr>
             <a:r>
+              <a:rPr lang="en-US" dirty="0"/>
+              <a:t>	</a:t>
+            </a:r>
+            <a:r>
               <a:rPr lang="en-US" dirty="0" smtClean="0"/>
+              <a:t>Output </a:t>
+            </a:r>
+            <a:r>
+              <a:rPr lang="en-US" dirty="0"/>
+              <a:t>- True if the word exists in </a:t>
+            </a:r>
+            <a:r>
+              <a:rPr lang="en-US" dirty="0" err="1"/>
+              <a:t>Sowpods</a:t>
+            </a:r>
+            <a:r>
+              <a:rPr lang="en-US" dirty="0" smtClean="0"/>
+              <a:t>.</a:t>
+            </a:r>
+            <a:r>
+              <a:rPr lang="en-US" dirty="0"/>
+              <a:t/>
+            </a:r>
+            <a:br>
+              <a:rPr lang="en-US" dirty="0"/>
+            </a:br>
+            <a:endParaRPr lang="en-US" dirty="0"/>
+          </a:p>
+          <a:p>
+            <a:pPr marL="0" indent="0">
+              <a:buNone/>
+            </a:pPr>
+            <a:r>
+              <a:rPr lang="en-US" dirty="0" smtClean="0"/>
+              <a:t>     b) </a:t>
+            </a:r>
+            <a:r>
+              <a:rPr lang="en-US" dirty="0" err="1" smtClean="0"/>
+              <a:t>getAllAnagrams</a:t>
+            </a:r>
+            <a:r>
+              <a:rPr lang="en-US" dirty="0"/>
+              <a:t> </a:t>
+            </a:r>
+            <a:br>
+              <a:rPr lang="en-US" dirty="0"/>
+            </a:br>
+            <a:r>
+              <a:rPr lang="en-US" dirty="0" smtClean="0"/>
+              <a:t>	Input </a:t>
+            </a:r>
+            <a:r>
+              <a:rPr lang="en-US" dirty="0"/>
+              <a:t>-  a </a:t>
+            </a:r>
+            <a:r>
+              <a:rPr lang="en-US" dirty="0" smtClean="0"/>
+              <a:t>word</a:t>
+            </a:r>
+          </a:p>
+          <a:p>
+            <a:pPr marL="0" indent="0">
+              <a:buNone/>
+            </a:pPr>
+            <a:r>
+              <a:rPr lang="en-US" dirty="0"/>
               <a:t>	</a:t>
             </a:r>
             <a:r>
-              <a:rPr lang="en-US" sz="2800" dirty="0" err="1" smtClean="0"/>
-              <a:t>ScrabbleHelper</a:t>
-            </a:r>
-            <a:r>
-              <a:rPr lang="en-US" sz="2800" dirty="0" smtClean="0"/>
-              <a:t> </a:t>
-            </a:r>
-            <a:r>
-              <a:rPr lang="en-US" sz="2800" dirty="0" err="1" smtClean="0"/>
-              <a:t>sh</a:t>
-            </a:r>
-            <a:r>
-              <a:rPr lang="en-US" sz="2800" dirty="0" smtClean="0"/>
-              <a:t> = new </a:t>
-            </a:r>
-            <a:r>
-              <a:rPr lang="en-US" sz="2800" dirty="0" err="1" smtClean="0"/>
-              <a:t>ScrabbleHelper</a:t>
-            </a:r>
-            <a:r>
-              <a:rPr lang="en-US" sz="2800" dirty="0" smtClean="0"/>
-              <a:t>()  (reads sowpods.txt and populates its </a:t>
-            </a:r>
-            <a:r>
-              <a:rPr lang="en-US" sz="2800" dirty="0" err="1" smtClean="0"/>
-              <a:t>hashmap</a:t>
-            </a:r>
-            <a:r>
-              <a:rPr lang="en-US" sz="2800" dirty="0" smtClean="0"/>
-              <a:t>)</a:t>
-            </a:r>
+              <a:rPr lang="en-US" dirty="0" smtClean="0"/>
+              <a:t>Output </a:t>
+            </a:r>
+            <a:r>
+              <a:rPr lang="en-US" dirty="0"/>
+              <a:t>-  All anagrams of the word which exist in </a:t>
+            </a:r>
+            <a:r>
+              <a:rPr lang="en-US" dirty="0" err="1" smtClean="0"/>
+              <a:t>Sowpods</a:t>
+            </a:r>
+            <a:endParaRPr lang="en-US" dirty="0" smtClean="0"/>
           </a:p>
           <a:p>
             <a:pPr marL="0" indent="0">
               <a:buNone/>
             </a:pPr>
-            <a:r>
-              <a:rPr lang="en-US" sz="2800" dirty="0" smtClean="0"/>
-              <a:t>	</a:t>
-            </a:r>
-            <a:r>
-              <a:rPr lang="en-US" sz="2800" dirty="0" err="1" smtClean="0"/>
-              <a:t>bool</a:t>
-            </a:r>
-            <a:r>
-              <a:rPr lang="en-US" sz="2800" dirty="0" smtClean="0"/>
-              <a:t> x = </a:t>
-            </a:r>
-            <a:r>
-              <a:rPr lang="en-US" sz="2800" dirty="0" err="1" smtClean="0"/>
-              <a:t>isValidWord</a:t>
-            </a:r>
-            <a:r>
-              <a:rPr lang="en-US" sz="2800" dirty="0" smtClean="0"/>
-              <a:t>("hello");</a:t>
-            </a:r>
+            <a:endParaRPr lang="en-US" dirty="0"/>
           </a:p>
           <a:p>
             <a:pPr marL="0" indent="0">
               <a:buNone/>
             </a:pPr>
-            <a:r>
-              <a:rPr lang="en-US" sz="2800" dirty="0" smtClean="0"/>
-              <a:t>	</a:t>
-            </a:r>
-            <a:r>
-              <a:rPr lang="en-US" sz="2800" dirty="0" err="1" smtClean="0"/>
-              <a:t>int</a:t>
-            </a:r>
-            <a:r>
-              <a:rPr lang="en-US" sz="2800" dirty="0" smtClean="0"/>
-              <a:t> x = </a:t>
-            </a:r>
-            <a:r>
-              <a:rPr lang="en-US" sz="2800" dirty="0" err="1" smtClean="0"/>
-              <a:t>calculateScore</a:t>
-            </a:r>
-            <a:r>
-              <a:rPr lang="en-US" sz="2800" dirty="0" smtClean="0"/>
-              <a:t>("hello");</a:t>
-            </a:r>
-          </a:p>
-          <a:p>
-            <a:pPr marL="0" indent="0">
-              <a:buNone/>
-            </a:pPr>
-            <a:r>
-              <a:rPr lang="en-US" sz="2800" dirty="0" smtClean="0"/>
-              <a:t>	List &lt;String&gt; words = </a:t>
-            </a:r>
-            <a:r>
-              <a:rPr lang="en-US" sz="2800" dirty="0" err="1" smtClean="0"/>
-              <a:t>getAllAnagrams</a:t>
-            </a:r>
-            <a:r>
-              <a:rPr lang="en-US" sz="2800" dirty="0" smtClean="0"/>
-              <a:t>("hello");</a:t>
-            </a:r>
-            <a:endParaRPr lang="en-US" sz="2800" dirty="0"/>
+            <a:endParaRPr lang="en-US" dirty="0" smtClean="0"/>
           </a:p>
         </p:txBody>
       </p:sp>
@@ -3397,7 +3433,9 @@
         </p:nvSpPr>
         <p:spPr/>
         <p:txBody>
-          <a:bodyPr/>
+          <a:bodyPr>
+            <a:normAutofit/>
+          </a:bodyPr>
           <a:lstStyle/>
           <a:p>
             <a:r>
@@ -3406,10 +3444,52 @@
             </a:r>
           </a:p>
           <a:p>
-            <a:r>
-              <a:rPr lang="en-US" dirty="0" smtClean="0"/>
-              <a:t>Usage:</a:t>
-            </a:r>
+            <a:pPr lvl="1"/>
+            <a:endParaRPr lang="en-US" dirty="0" smtClean="0"/>
+          </a:p>
+          <a:p>
+            <a:pPr marL="0" indent="0">
+              <a:buNone/>
+            </a:pPr>
+            <a:r>
+              <a:rPr lang="en-US" sz="2800" dirty="0" err="1" smtClean="0"/>
+              <a:t>ArrayList</a:t>
+            </a:r>
+            <a:r>
+              <a:rPr lang="en-US" sz="2800" dirty="0" smtClean="0"/>
+              <a:t> &lt;String&gt; </a:t>
+            </a:r>
+            <a:r>
+              <a:rPr lang="en-US" sz="2800" dirty="0" err="1" smtClean="0"/>
+              <a:t>getCombinations</a:t>
+            </a:r>
+            <a:r>
+              <a:rPr lang="en-US" sz="2800" dirty="0" smtClean="0"/>
+              <a:t>(String rack)</a:t>
+            </a:r>
+          </a:p>
+          <a:p>
+            <a:pPr marL="0" indent="0">
+              <a:buNone/>
+            </a:pPr>
+            <a:r>
+              <a:rPr lang="en-US" sz="2800" dirty="0" smtClean="0"/>
+              <a:t>Input: rack of </a:t>
+            </a:r>
+            <a:r>
+              <a:rPr lang="en-US" sz="2800" dirty="0" smtClean="0"/>
+              <a:t>tiles</a:t>
+            </a:r>
+          </a:p>
+          <a:p>
+            <a:pPr marL="0" indent="0">
+              <a:buNone/>
+            </a:pPr>
+            <a:r>
+              <a:rPr lang="en-US" sz="2800" dirty="0" smtClean="0"/>
+              <a:t>Output: All possible combinations that can be made with the tiles</a:t>
+            </a:r>
+            <a:endParaRPr lang="en-US" sz="2800" dirty="0" smtClean="0"/>
           </a:p>
           <a:p>
             <a:pPr marL="0" indent="0">
@@ -3418,45 +3498,6 @@
             <a:r>
               <a:rPr lang="en-US" dirty="0" smtClean="0"/>
               <a:t>	</a:t>
-            </a:r>
-            <a:r>
-              <a:rPr lang="en-US" sz="2800" dirty="0" smtClean="0"/>
-              <a:t>Combinations c = new Combinations("ab*c")</a:t>
-            </a:r>
-          </a:p>
-          <a:p>
-            <a:pPr marL="0" indent="0">
-              <a:buNone/>
-            </a:pPr>
-            <a:r>
-              <a:rPr lang="en-US" sz="2800" dirty="0" smtClean="0"/>
-              <a:t>	for (combination : </a:t>
-            </a:r>
-            <a:r>
-              <a:rPr lang="en-US" sz="2800" dirty="0" err="1" smtClean="0"/>
-              <a:t>c.combinations</a:t>
-            </a:r>
-            <a:r>
-              <a:rPr lang="en-US" sz="2800" dirty="0" smtClean="0"/>
-              <a:t>) {</a:t>
-            </a:r>
-          </a:p>
-          <a:p>
-            <a:pPr marL="0" indent="0">
-              <a:buNone/>
-            </a:pPr>
-            <a:r>
-              <a:rPr lang="en-US" sz="2800" dirty="0" smtClean="0"/>
-              <a:t>		//iterate</a:t>
-            </a:r>
-          </a:p>
-          <a:p>
-            <a:pPr marL="0" indent="0">
-              <a:buNone/>
-            </a:pPr>
-            <a:r>
-              <a:rPr lang="en-US" sz="2800" dirty="0" smtClean="0"/>
-              <a:t>	}</a:t>
             </a:r>
             <a:endParaRPr lang="en-US" sz="2800" dirty="0"/>
           </a:p>
@@ -3578,6 +3619,10 @@
             </a:r>
             <a:r>
               <a:rPr lang="en-US" sz="2800" dirty="0" err="1" smtClean="0"/>
+              <a:t>FilterUtility.</a:t>
+            </a:r>
+            <a:r>
+              <a:rPr lang="en-US" sz="2800" dirty="0" err="1" smtClean="0"/>
               <a:t>matchUserRequest</a:t>
             </a:r>
             <a:r>
@@ -3813,6 +3858,116 @@
     <p:extLst>
       <p:ext uri="{BB962C8B-B14F-4D97-AF65-F5344CB8AC3E}">
         <p14:creationId xmlns:p14="http://schemas.microsoft.com/office/powerpoint/2010/main" val="3552035083"/>
+      </p:ext>
+    </p:extLst>
+  </p:cSld>
+  <p:clrMapOvr>
+    <a:masterClrMapping/>
+  </p:clrMapOvr>
+</p:sld>
+</file>
+
+<file path=ppt/slides/slide7.xml><?xml version="1.0" encoding="utf-8"?>
+<p:sld xmlns:a="http://schemas.openxmlformats.org/drawingml/2006/main" xmlns:r="http://schemas.openxmlformats.org/officeDocument/2006/relationships" xmlns:p="http://schemas.openxmlformats.org/presentationml/2006/main">
+  <p:cSld>
+    <p:spTree>
+      <p:nvGrpSpPr>
+        <p:cNvPr id="1" name=""/>
+        <p:cNvGrpSpPr/>
+        <p:nvPr/>
+      </p:nvGrpSpPr>
+      <p:grpSpPr>
+        <a:xfrm>
+          <a:off x="0" y="0"/>
+          <a:ext cx="0" cy="0"/>
+          <a:chOff x="0" y="0"/>
+          <a:chExt cx="0" cy="0"/>
+        </a:xfrm>
+      </p:grpSpPr>
+      <p:sp>
+        <p:nvSpPr>
+          <p:cNvPr id="2" name="Title 1"/>
+          <p:cNvSpPr>
+            <a:spLocks noGrp="1"/>
+          </p:cNvSpPr>
+          <p:nvPr>
+            <p:ph type="title"/>
+          </p:nvPr>
+        </p:nvSpPr>
+        <p:spPr/>
+        <p:txBody>
+          <a:bodyPr/>
+          <a:lstStyle/>
+          <a:p>
+            <a:r>
+              <a:rPr lang="en-US" dirty="0" smtClean="0"/>
+              <a:t>Flow of main program</a:t>
+            </a:r>
+            <a:endParaRPr lang="en-US" dirty="0"/>
+          </a:p>
+        </p:txBody>
+      </p:sp>
+      <p:sp>
+        <p:nvSpPr>
+          <p:cNvPr id="3" name="Content Placeholder 2"/>
+          <p:cNvSpPr>
+            <a:spLocks noGrp="1"/>
+          </p:cNvSpPr>
+          <p:nvPr>
+            <p:ph idx="1"/>
+          </p:nvPr>
+        </p:nvSpPr>
+        <p:spPr/>
+        <p:txBody>
+          <a:bodyPr/>
+          <a:lstStyle/>
+          <a:p>
+            <a:r>
+              <a:rPr lang="en-US" dirty="0" smtClean="0"/>
+              <a:t>Get input rack and constraint</a:t>
+            </a:r>
+          </a:p>
+          <a:p>
+            <a:r>
+              <a:rPr lang="en-US" dirty="0" smtClean="0"/>
+              <a:t>Add characters in constraint to rack</a:t>
+            </a:r>
+          </a:p>
+          <a:p>
+            <a:r>
+              <a:rPr lang="en-US" dirty="0" smtClean="0"/>
+              <a:t>Get all combinations of rack</a:t>
+            </a:r>
+          </a:p>
+          <a:p>
+            <a:r>
+              <a:rPr lang="en-US" dirty="0" smtClean="0"/>
+              <a:t>Check if each combination is a valid word, if it is, get all possible anagrams and add to list of result</a:t>
+            </a:r>
+          </a:p>
+          <a:p>
+            <a:r>
+              <a:rPr lang="en-US" dirty="0" smtClean="0"/>
+              <a:t>Filter list of results</a:t>
+            </a:r>
+          </a:p>
+          <a:p>
+            <a:r>
+              <a:rPr lang="en-US" dirty="0" smtClean="0"/>
+              <a:t>Sort results by score and </a:t>
+            </a:r>
+            <a:r>
+              <a:rPr lang="en-US" smtClean="0"/>
+              <a:t>print results</a:t>
+            </a:r>
+            <a:endParaRPr lang="en-US" dirty="0"/>
+          </a:p>
+        </p:txBody>
+      </p:sp>
+    </p:spTree>
+    <p:extLst>
+      <p:ext uri="{BB962C8B-B14F-4D97-AF65-F5344CB8AC3E}">
+        <p14:creationId xmlns:p14="http://schemas.microsoft.com/office/powerpoint/2010/main" val="1753093840"/>
       </p:ext>
     </p:extLst>
   </p:cSld>

</xml_diff>

<commit_message>
changed printutility to sortutility
</commit_message>
<xml_diff>
--- a/Scrabble Word Suggestor.pptx
+++ b/Scrabble Word Suggestor.pptx
@@ -3353,11 +3353,7 @@
             </a:pPr>
             <a:r>
               <a:rPr lang="en-US" dirty="0" smtClean="0"/>
-              <a:t>     b</a:t>
-            </a:r>
-            <a:r>
-              <a:rPr lang="en-US" dirty="0" smtClean="0"/>
-              <a:t>) </a:t>
+              <a:t>     b) </a:t>
             </a:r>
             <a:r>
               <a:rPr lang="en-US" sz="2600" dirty="0">
@@ -3678,11 +3674,7 @@
             </a:pPr>
             <a:r>
               <a:rPr lang="en-US" sz="2800" dirty="0" smtClean="0"/>
-              <a:t>Output</a:t>
-            </a:r>
-            <a:r>
-              <a:rPr lang="en-US" sz="2800" dirty="0" smtClean="0"/>
-              <a:t>: All possible combinations that can be made with the tiles</a:t>
+              <a:t>Output: All possible combinations that can be made with the tiles</a:t>
             </a:r>
           </a:p>
           <a:p>
@@ -4065,7 +4057,6 @@
               <a:rPr lang="en-US" dirty="0" smtClean="0"/>
               <a:t>	Input- A regular expression and a word </a:t>
             </a:r>
-            <a:endParaRPr lang="en-US" dirty="0" smtClean="0"/>
           </a:p>
           <a:p>
             <a:pPr marL="457200" lvl="1" indent="0">
@@ -4075,7 +4066,6 @@
               <a:rPr lang="en-US" dirty="0" smtClean="0"/>
               <a:t>	Output – True if word matches given regular 	expression</a:t>
             </a:r>
-            <a:endParaRPr lang="en-US" dirty="0" smtClean="0"/>
           </a:p>
           <a:p>
             <a:pPr marL="0" indent="0">
@@ -4139,7 +4129,7 @@
           <a:p>
             <a:r>
               <a:rPr lang="en-US" dirty="0" err="1" smtClean="0"/>
-              <a:t>PrinterUtility</a:t>
+              <a:t>SortUtility</a:t>
             </a:r>
             <a:endParaRPr lang="en-US" dirty="0"/>
           </a:p>
@@ -4158,7 +4148,7 @@
         <p:spPr/>
         <p:txBody>
           <a:bodyPr>
-            <a:normAutofit fontScale="92500" lnSpcReduction="10000"/>
+            <a:normAutofit/>
           </a:bodyPr>
           <a:lstStyle/>
           <a:p>
@@ -4170,7 +4160,7 @@
               <a:t>	</a:t>
             </a:r>
             <a:r>
-              <a:rPr lang="en-US" sz="2000" dirty="0">
+              <a:rPr lang="en-US" sz="2000" dirty="0" err="1" smtClean="0">
                 <a:solidFill>
                   <a:srgbClr val="000000"/>
                 </a:solidFill>
@@ -4179,10 +4169,22 @@
                 </a:highlight>
                 <a:latin typeface="Consolas"/>
               </a:rPr>
-              <a:t>List&lt;Word&gt; </a:t>
-            </a:r>
-            <a:r>
-              <a:rPr lang="en-US" sz="2000" dirty="0" err="1">
+              <a:t>ArrayList</a:t>
+            </a:r>
+            <a:r>
+              <a:rPr lang="en-US" sz="2000" dirty="0" smtClean="0">
+                <a:solidFill>
+                  <a:srgbClr val="000000"/>
+                </a:solidFill>
+                <a:highlight>
+                  <a:srgbClr val="E8F2FE"/>
+                </a:highlight>
+                <a:latin typeface="Consolas"/>
+              </a:rPr>
+              <a:t>&lt;String&gt;</a:t>
+            </a:r>
+            <a:r>
+              <a:rPr lang="en-US" sz="2000" smtClean="0">
                 <a:solidFill>
                   <a:srgbClr val="000000"/>
                 </a:solidFill>
@@ -4191,10 +4193,10 @@
                 </a:highlight>
                 <a:latin typeface="Consolas"/>
               </a:rPr>
-              <a:t>sortWordsByRank</a:t>
-            </a:r>
-            <a:r>
-              <a:rPr lang="en-US" sz="2000" dirty="0">
+              <a:t>sortWordsByScore</a:t>
+            </a:r>
+            <a:r>
+              <a:rPr lang="en-US" sz="2000" smtClean="0">
                 <a:solidFill>
                   <a:srgbClr val="000000"/>
                 </a:solidFill>
@@ -4206,7 +4208,7 @@
               <a:t>(Map&lt;</a:t>
             </a:r>
             <a:r>
-              <a:rPr lang="en-US" sz="2000" dirty="0" err="1">
+              <a:rPr lang="en-US" sz="2000" dirty="0" err="1" smtClean="0">
                 <a:solidFill>
                   <a:srgbClr val="000000"/>
                 </a:solidFill>
@@ -4276,7 +4278,15 @@
             </a:r>
             <a:r>
               <a:rPr lang="en-US" sz="2800" dirty="0" smtClean="0"/>
-              <a:t> words and their score</a:t>
+              <a:t> </a:t>
+            </a:r>
+            <a:r>
+              <a:rPr lang="en-US" sz="2800" dirty="0" smtClean="0"/>
+              <a:t>of words </a:t>
+            </a:r>
+            <a:r>
+              <a:rPr lang="en-US" sz="2800" dirty="0" smtClean="0"/>
+              <a:t>and their score</a:t>
             </a:r>
           </a:p>
           <a:p>
@@ -4300,7 +4310,6 @@
               <a:rPr lang="en-US" sz="2800" dirty="0" smtClean="0"/>
               <a:t> </a:t>
             </a:r>
-            <a:endParaRPr lang="en-US" sz="2800" dirty="0" smtClean="0"/>
           </a:p>
           <a:p>
             <a:pPr marL="0" indent="0">
@@ -4309,168 +4318,6 @@
             <a:r>
               <a:rPr lang="en-US" sz="2800" dirty="0" smtClean="0"/>
               <a:t>	</a:t>
-            </a:r>
-            <a:r>
-              <a:rPr lang="en-US" sz="2400" dirty="0">
-                <a:solidFill>
-                  <a:srgbClr val="7F0055"/>
-                </a:solidFill>
-                <a:highlight>
-                  <a:srgbClr val="E8F2FE"/>
-                </a:highlight>
-                <a:latin typeface="Consolas"/>
-              </a:rPr>
-              <a:t>void</a:t>
-            </a:r>
-            <a:r>
-              <a:rPr lang="en-US" sz="2400" dirty="0">
-                <a:solidFill>
-                  <a:srgbClr val="000000"/>
-                </a:solidFill>
-                <a:highlight>
-                  <a:srgbClr val="E8F2FE"/>
-                </a:highlight>
-                <a:latin typeface="Consolas"/>
-              </a:rPr>
-              <a:t> </a:t>
-            </a:r>
-            <a:r>
-              <a:rPr lang="en-US" sz="2400" dirty="0" err="1">
-                <a:solidFill>
-                  <a:srgbClr val="000000"/>
-                </a:solidFill>
-                <a:highlight>
-                  <a:srgbClr val="E8F2FE"/>
-                </a:highlight>
-                <a:latin typeface="Consolas"/>
-              </a:rPr>
-              <a:t>printWords</a:t>
-            </a:r>
-            <a:r>
-              <a:rPr lang="en-US" sz="2400" dirty="0">
-                <a:solidFill>
-                  <a:srgbClr val="000000"/>
-                </a:solidFill>
-                <a:highlight>
-                  <a:srgbClr val="E8F2FE"/>
-                </a:highlight>
-                <a:latin typeface="Consolas"/>
-              </a:rPr>
-              <a:t>(List&lt;Word&gt; </a:t>
-            </a:r>
-            <a:r>
-              <a:rPr lang="en-US" sz="2400" dirty="0" err="1" smtClean="0">
-                <a:solidFill>
-                  <a:srgbClr val="6A3E3E"/>
-                </a:solidFill>
-                <a:highlight>
-                  <a:srgbClr val="E8F2FE"/>
-                </a:highlight>
-                <a:latin typeface="Consolas"/>
-              </a:rPr>
-              <a:t>sortedWords</a:t>
-            </a:r>
-            <a:r>
-              <a:rPr lang="en-US" sz="2400" dirty="0" err="1" smtClean="0">
-                <a:solidFill>
-                  <a:srgbClr val="000000"/>
-                </a:solidFill>
-                <a:highlight>
-                  <a:srgbClr val="E8F2FE"/>
-                </a:highlight>
-                <a:latin typeface="Consolas"/>
-              </a:rPr>
-              <a:t>,</a:t>
-            </a:r>
-            <a:r>
-              <a:rPr lang="en-US" sz="2400" dirty="0" err="1" smtClean="0">
-                <a:solidFill>
-                  <a:srgbClr val="7F0055"/>
-                </a:solidFill>
-                <a:highlight>
-                  <a:srgbClr val="E8F2FE"/>
-                </a:highlight>
-                <a:latin typeface="Consolas"/>
-              </a:rPr>
-              <a:t>int</a:t>
-            </a:r>
-            <a:r>
-              <a:rPr lang="en-US" sz="2400" dirty="0" smtClean="0">
-                <a:solidFill>
-                  <a:srgbClr val="000000"/>
-                </a:solidFill>
-                <a:highlight>
-                  <a:srgbClr val="E8F2FE"/>
-                </a:highlight>
-                <a:latin typeface="Consolas"/>
-              </a:rPr>
-              <a:t> </a:t>
-            </a:r>
-            <a:r>
-              <a:rPr lang="en-US" sz="2400" dirty="0">
-                <a:solidFill>
-                  <a:srgbClr val="6A3E3E"/>
-                </a:solidFill>
-                <a:highlight>
-                  <a:srgbClr val="E8F2FE"/>
-                </a:highlight>
-                <a:latin typeface="Consolas"/>
-              </a:rPr>
-              <a:t>limiter</a:t>
-            </a:r>
-            <a:r>
-              <a:rPr lang="en-US" sz="2400" dirty="0">
-                <a:solidFill>
-                  <a:srgbClr val="000000"/>
-                </a:solidFill>
-                <a:highlight>
-                  <a:srgbClr val="E8F2FE"/>
-                </a:highlight>
-                <a:latin typeface="Consolas"/>
-              </a:rPr>
-              <a:t>)</a:t>
-            </a:r>
-            <a:r>
-              <a:rPr lang="en-US" sz="2800" dirty="0" smtClean="0"/>
-              <a:t>	</a:t>
-            </a:r>
-          </a:p>
-          <a:p>
-            <a:pPr marL="0" indent="0">
-              <a:buNone/>
-            </a:pPr>
-            <a:r>
-              <a:rPr lang="en-US" sz="2800" dirty="0"/>
-              <a:t>	</a:t>
-            </a:r>
-            <a:r>
-              <a:rPr lang="en-US" sz="2800" dirty="0" smtClean="0"/>
-              <a:t>Input: List of words</a:t>
-            </a:r>
-          </a:p>
-          <a:p>
-            <a:pPr marL="0" indent="0">
-              <a:buNone/>
-            </a:pPr>
-            <a:r>
-              <a:rPr lang="en-US" sz="2800" dirty="0"/>
-              <a:t>	</a:t>
-            </a:r>
-            <a:r>
-              <a:rPr lang="en-US" sz="2800" dirty="0" smtClean="0"/>
-              <a:t>Output: Prints all elements in the list </a:t>
-            </a:r>
-            <a:r>
-              <a:rPr lang="en-US" sz="2800" dirty="0" err="1" smtClean="0"/>
-              <a:t>upto</a:t>
-            </a:r>
-            <a:r>
-              <a:rPr lang="en-US" sz="2800" dirty="0" smtClean="0"/>
-              <a:t> </a:t>
-            </a:r>
-            <a:r>
-              <a:rPr lang="en-US" sz="2800" smtClean="0"/>
-              <a:t>	maxToPrint elements</a:t>
             </a:r>
             <a:endParaRPr lang="en-US" sz="2800" dirty="0"/>
           </a:p>
@@ -4551,15 +4398,99 @@
           <a:bodyPr/>
           <a:lstStyle/>
           <a:p>
+            <a:pPr marL="0" indent="0">
+              <a:buNone/>
+            </a:pPr>
+            <a:r>
+              <a:rPr lang="en-US" sz="2400" dirty="0" err="1">
+                <a:solidFill>
+                  <a:srgbClr val="000000"/>
+                </a:solidFill>
+                <a:highlight>
+                  <a:srgbClr val="E8F2FE"/>
+                </a:highlight>
+                <a:latin typeface="Consolas"/>
+              </a:rPr>
+              <a:t>printScrabbleWordSuggestions</a:t>
+            </a:r>
+            <a:r>
+              <a:rPr lang="en-US" sz="2400" dirty="0">
+                <a:solidFill>
+                  <a:srgbClr val="000000"/>
+                </a:solidFill>
+                <a:highlight>
+                  <a:srgbClr val="E8F2FE"/>
+                </a:highlight>
+                <a:latin typeface="Consolas"/>
+              </a:rPr>
+              <a:t>(String </a:t>
+            </a:r>
+            <a:r>
+              <a:rPr lang="en-US" sz="2400" dirty="0">
+                <a:solidFill>
+                  <a:srgbClr val="6A3E3E"/>
+                </a:solidFill>
+                <a:highlight>
+                  <a:srgbClr val="E8F2FE"/>
+                </a:highlight>
+                <a:latin typeface="Consolas"/>
+              </a:rPr>
+              <a:t>rack</a:t>
+            </a:r>
+            <a:r>
+              <a:rPr lang="en-US" sz="2400" dirty="0">
+                <a:solidFill>
+                  <a:srgbClr val="000000"/>
+                </a:solidFill>
+                <a:highlight>
+                  <a:srgbClr val="E8F2FE"/>
+                </a:highlight>
+                <a:latin typeface="Consolas"/>
+              </a:rPr>
+              <a:t>, String </a:t>
+            </a:r>
+            <a:r>
+              <a:rPr lang="en-US" sz="2400" dirty="0">
+                <a:solidFill>
+                  <a:srgbClr val="6A3E3E"/>
+                </a:solidFill>
+                <a:highlight>
+                  <a:srgbClr val="E8F2FE"/>
+                </a:highlight>
+                <a:latin typeface="Consolas"/>
+              </a:rPr>
+              <a:t>constraint</a:t>
+            </a:r>
+            <a:r>
+              <a:rPr lang="en-US" sz="2400" dirty="0">
+                <a:solidFill>
+                  <a:srgbClr val="000000"/>
+                </a:solidFill>
+                <a:highlight>
+                  <a:srgbClr val="E8F2FE"/>
+                </a:highlight>
+                <a:latin typeface="Consolas"/>
+              </a:rPr>
+              <a:t>)</a:t>
+            </a:r>
+            <a:endParaRPr lang="en-US" sz="2400" dirty="0" smtClean="0"/>
+          </a:p>
+          <a:p>
+            <a:pPr marL="0" indent="0">
+              <a:buNone/>
+            </a:pPr>
             <a:r>
               <a:rPr lang="en-US" dirty="0" smtClean="0"/>
-              <a:t>Takes rack, constraint as command line arguments</a:t>
-            </a:r>
-          </a:p>
-          <a:p>
+              <a:t>Input:  Tiles in rack and constraint as string inputs</a:t>
+            </a:r>
+          </a:p>
+          <a:p>
+            <a:pPr marL="0" indent="0">
+              <a:buNone/>
+            </a:pPr>
             <a:r>
               <a:rPr lang="en-US" dirty="0" smtClean="0"/>
-              <a:t>Prints best 10 possible words</a:t>
+              <a:t>Output: Prints best 10 words that can be formed</a:t>
             </a:r>
             <a:endParaRPr lang="en-US" dirty="0"/>
           </a:p>

</xml_diff>